<commit_message>
Ajout du Zoning.pptx + finition du cahier des charges
</commit_message>
<xml_diff>
--- a/Documentation/01d_Arborescence.pptx
+++ b/Documentation/01d_Arborescence.pptx
@@ -112,6 +112,14 @@
 </p:presentation>
 </file>
 
+<file path=ppt/revisionInfo.xml><?xml version="1.0" encoding="utf-8"?>
+<p1510:revInfo xmlns:a="http://schemas.openxmlformats.org/drawingml/2006/main" xmlns:r="http://schemas.openxmlformats.org/officeDocument/2006/relationships" xmlns:p1510="http://schemas.microsoft.com/office/powerpoint/2015/10/main">
+  <p1510:revLst>
+    <p1510:client id="{00521DE1-400C-4DFA-B2EA-22EF9A2280FF}" v="11" dt="2020-01-10T09:43:23.801"/>
+  </p1510:revLst>
+</p1510:revInfo>
+</file>
+
 <file path=ppt/changesInfos/changesInfo1.xml><?xml version="1.0" encoding="utf-8"?>
 <pc:chgInfo xmlns:a="http://schemas.openxmlformats.org/drawingml/2006/main" xmlns:r="http://schemas.openxmlformats.org/officeDocument/2006/relationships" xmlns:ac="http://schemas.microsoft.com/office/drawing/2013/main/command" xmlns:pc="http://schemas.microsoft.com/office/powerpoint/2013/main/command">
   <pc:docChgLst>
@@ -685,6 +693,286 @@
             <pc:docMk/>
             <pc:sldMk cId="592735644" sldId="256"/>
             <ac:cxnSpMk id="60" creationId="{7636C0CC-A803-40F4-9646-D047A9BCE704}"/>
+          </ac:cxnSpMkLst>
+        </pc:cxnChg>
+      </pc:sldChg>
+    </pc:docChg>
+  </pc:docChgLst>
+  <pc:docChgLst>
+    <pc:chgData name="Vivian G" userId="217fb073e6d8a319" providerId="LiveId" clId="{00521DE1-400C-4DFA-B2EA-22EF9A2280FF}"/>
+    <pc:docChg chg="undo custSel modSld">
+      <pc:chgData name="Vivian G" userId="217fb073e6d8a319" providerId="LiveId" clId="{00521DE1-400C-4DFA-B2EA-22EF9A2280FF}" dt="2020-01-10T11:04:08.224" v="366" actId="14100"/>
+      <pc:docMkLst>
+        <pc:docMk/>
+      </pc:docMkLst>
+      <pc:sldChg chg="addSp delSp modSp">
+        <pc:chgData name="Vivian G" userId="217fb073e6d8a319" providerId="LiveId" clId="{00521DE1-400C-4DFA-B2EA-22EF9A2280FF}" dt="2020-01-10T11:04:08.224" v="366" actId="14100"/>
+        <pc:sldMkLst>
+          <pc:docMk/>
+          <pc:sldMk cId="592735644" sldId="256"/>
+        </pc:sldMkLst>
+        <pc:spChg chg="mod">
+          <ac:chgData name="Vivian G" userId="217fb073e6d8a319" providerId="LiveId" clId="{00521DE1-400C-4DFA-B2EA-22EF9A2280FF}" dt="2020-01-10T09:39:39.150" v="179" actId="1035"/>
+          <ac:spMkLst>
+            <pc:docMk/>
+            <pc:sldMk cId="592735644" sldId="256"/>
+            <ac:spMk id="4" creationId="{A2539634-B25C-4AC1-99AC-7DA9BB56BCAC}"/>
+          </ac:spMkLst>
+        </pc:spChg>
+        <pc:spChg chg="mod">
+          <ac:chgData name="Vivian G" userId="217fb073e6d8a319" providerId="LiveId" clId="{00521DE1-400C-4DFA-B2EA-22EF9A2280FF}" dt="2020-01-10T09:39:39.150" v="179" actId="1035"/>
+          <ac:spMkLst>
+            <pc:docMk/>
+            <pc:sldMk cId="592735644" sldId="256"/>
+            <ac:spMk id="5" creationId="{D360F008-0350-40A1-A1FC-8BD25D46955C}"/>
+          </ac:spMkLst>
+        </pc:spChg>
+        <pc:spChg chg="mod">
+          <ac:chgData name="Vivian G" userId="217fb073e6d8a319" providerId="LiveId" clId="{00521DE1-400C-4DFA-B2EA-22EF9A2280FF}" dt="2020-01-10T09:40:22.542" v="217" actId="1035"/>
+          <ac:spMkLst>
+            <pc:docMk/>
+            <pc:sldMk cId="592735644" sldId="256"/>
+            <ac:spMk id="6" creationId="{631CF34C-AB3B-46B0-AB87-C9C8DC32DD3D}"/>
+          </ac:spMkLst>
+        </pc:spChg>
+        <pc:spChg chg="mod">
+          <ac:chgData name="Vivian G" userId="217fb073e6d8a319" providerId="LiveId" clId="{00521DE1-400C-4DFA-B2EA-22EF9A2280FF}" dt="2020-01-10T09:41:09.430" v="304" actId="1036"/>
+          <ac:spMkLst>
+            <pc:docMk/>
+            <pc:sldMk cId="592735644" sldId="256"/>
+            <ac:spMk id="7" creationId="{09768C9B-9E81-4FD2-8E18-385B5449E62C}"/>
+          </ac:spMkLst>
+        </pc:spChg>
+        <pc:spChg chg="mod">
+          <ac:chgData name="Vivian G" userId="217fb073e6d8a319" providerId="LiveId" clId="{00521DE1-400C-4DFA-B2EA-22EF9A2280FF}" dt="2020-01-10T09:40:22.542" v="217" actId="1035"/>
+          <ac:spMkLst>
+            <pc:docMk/>
+            <pc:sldMk cId="592735644" sldId="256"/>
+            <ac:spMk id="9" creationId="{04E1DB3F-66B1-4FB1-87E8-C191BAC64DA7}"/>
+          </ac:spMkLst>
+        </pc:spChg>
+        <pc:spChg chg="mod">
+          <ac:chgData name="Vivian G" userId="217fb073e6d8a319" providerId="LiveId" clId="{00521DE1-400C-4DFA-B2EA-22EF9A2280FF}" dt="2020-01-10T09:40:22.542" v="217" actId="1035"/>
+          <ac:spMkLst>
+            <pc:docMk/>
+            <pc:sldMk cId="592735644" sldId="256"/>
+            <ac:spMk id="10" creationId="{F7F91496-761D-4F7A-8C79-7CA9ECE3725C}"/>
+          </ac:spMkLst>
+        </pc:spChg>
+        <pc:spChg chg="mod">
+          <ac:chgData name="Vivian G" userId="217fb073e6d8a319" providerId="LiveId" clId="{00521DE1-400C-4DFA-B2EA-22EF9A2280FF}" dt="2020-01-10T09:40:22.542" v="217" actId="1035"/>
+          <ac:spMkLst>
+            <pc:docMk/>
+            <pc:sldMk cId="592735644" sldId="256"/>
+            <ac:spMk id="11" creationId="{8400C930-441B-4EDA-ADA2-ED1B1167E279}"/>
+          </ac:spMkLst>
+        </pc:spChg>
+        <pc:spChg chg="mod">
+          <ac:chgData name="Vivian G" userId="217fb073e6d8a319" providerId="LiveId" clId="{00521DE1-400C-4DFA-B2EA-22EF9A2280FF}" dt="2020-01-10T09:41:09.430" v="304" actId="1036"/>
+          <ac:spMkLst>
+            <pc:docMk/>
+            <pc:sldMk cId="592735644" sldId="256"/>
+            <ac:spMk id="12" creationId="{91CE377E-1547-4572-B6C1-FEE809D4A90E}"/>
+          </ac:spMkLst>
+        </pc:spChg>
+        <pc:spChg chg="mod">
+          <ac:chgData name="Vivian G" userId="217fb073e6d8a319" providerId="LiveId" clId="{00521DE1-400C-4DFA-B2EA-22EF9A2280FF}" dt="2020-01-10T09:41:09.430" v="304" actId="1036"/>
+          <ac:spMkLst>
+            <pc:docMk/>
+            <pc:sldMk cId="592735644" sldId="256"/>
+            <ac:spMk id="13" creationId="{27CCAB0B-CC30-418A-B24E-4CFBC62E1DB7}"/>
+          </ac:spMkLst>
+        </pc:spChg>
+        <pc:spChg chg="mod">
+          <ac:chgData name="Vivian G" userId="217fb073e6d8a319" providerId="LiveId" clId="{00521DE1-400C-4DFA-B2EA-22EF9A2280FF}" dt="2020-01-10T09:41:09.430" v="304" actId="1036"/>
+          <ac:spMkLst>
+            <pc:docMk/>
+            <pc:sldMk cId="592735644" sldId="256"/>
+            <ac:spMk id="14" creationId="{BC27DBA4-A2DE-4BB7-8402-791F0E0A1591}"/>
+          </ac:spMkLst>
+        </pc:spChg>
+        <pc:spChg chg="mod">
+          <ac:chgData name="Vivian G" userId="217fb073e6d8a319" providerId="LiveId" clId="{00521DE1-400C-4DFA-B2EA-22EF9A2280FF}" dt="2020-01-10T09:41:09.430" v="304" actId="1036"/>
+          <ac:spMkLst>
+            <pc:docMk/>
+            <pc:sldMk cId="592735644" sldId="256"/>
+            <ac:spMk id="15" creationId="{1C5114D2-DD4D-49BB-A8B7-7A6F2427FE63}"/>
+          </ac:spMkLst>
+        </pc:spChg>
+        <pc:spChg chg="mod">
+          <ac:chgData name="Vivian G" userId="217fb073e6d8a319" providerId="LiveId" clId="{00521DE1-400C-4DFA-B2EA-22EF9A2280FF}" dt="2020-01-10T09:42:40.121" v="359" actId="14100"/>
+          <ac:spMkLst>
+            <pc:docMk/>
+            <pc:sldMk cId="592735644" sldId="256"/>
+            <ac:spMk id="16" creationId="{F9C8E049-9709-4609-B97C-B9BFB62B324F}"/>
+          </ac:spMkLst>
+        </pc:spChg>
+        <pc:spChg chg="add mod">
+          <ac:chgData name="Vivian G" userId="217fb073e6d8a319" providerId="LiveId" clId="{00521DE1-400C-4DFA-B2EA-22EF9A2280FF}" dt="2020-01-10T09:41:25.100" v="309" actId="20577"/>
+          <ac:spMkLst>
+            <pc:docMk/>
+            <pc:sldMk cId="592735644" sldId="256"/>
+            <ac:spMk id="43" creationId="{74C49387-C25C-45C2-A515-24B7FC6723AF}"/>
+          </ac:spMkLst>
+        </pc:spChg>
+        <pc:spChg chg="add del">
+          <ac:chgData name="Vivian G" userId="217fb073e6d8a319" providerId="LiveId" clId="{00521DE1-400C-4DFA-B2EA-22EF9A2280FF}" dt="2020-01-10T09:41:31.082" v="311"/>
+          <ac:spMkLst>
+            <pc:docMk/>
+            <pc:sldMk cId="592735644" sldId="256"/>
+            <ac:spMk id="46" creationId="{ADCC5B5D-479E-481A-9CEB-2FF25C1C4C75}"/>
+          </ac:spMkLst>
+        </pc:spChg>
+        <pc:spChg chg="add mod">
+          <ac:chgData name="Vivian G" userId="217fb073e6d8a319" providerId="LiveId" clId="{00521DE1-400C-4DFA-B2EA-22EF9A2280FF}" dt="2020-01-10T09:43:27.667" v="363" actId="1076"/>
+          <ac:spMkLst>
+            <pc:docMk/>
+            <pc:sldMk cId="592735644" sldId="256"/>
+            <ac:spMk id="48" creationId="{63FCBDCE-0399-46AA-85D9-72870B078A6D}"/>
+          </ac:spMkLst>
+        </pc:spChg>
+        <pc:cxnChg chg="add del mod">
+          <ac:chgData name="Vivian G" userId="217fb073e6d8a319" providerId="LiveId" clId="{00521DE1-400C-4DFA-B2EA-22EF9A2280FF}" dt="2020-01-10T09:21:29.408" v="10" actId="11529"/>
+          <ac:cxnSpMkLst>
+            <pc:docMk/>
+            <pc:sldMk cId="592735644" sldId="256"/>
+            <ac:cxnSpMk id="19" creationId="{534CBB44-10E4-4FA6-809D-9377EB453C97}"/>
+          </ac:cxnSpMkLst>
+        </pc:cxnChg>
+        <pc:cxnChg chg="add mod">
+          <ac:chgData name="Vivian G" userId="217fb073e6d8a319" providerId="LiveId" clId="{00521DE1-400C-4DFA-B2EA-22EF9A2280FF}" dt="2020-01-10T09:42:24.832" v="355" actId="14100"/>
+          <ac:cxnSpMkLst>
+            <pc:docMk/>
+            <pc:sldMk cId="592735644" sldId="256"/>
+            <ac:cxnSpMk id="21" creationId="{D863ACD5-98FF-4C8E-93C9-ED08269FE3BF}"/>
+          </ac:cxnSpMkLst>
+        </pc:cxnChg>
+        <pc:cxnChg chg="add del mod">
+          <ac:chgData name="Vivian G" userId="217fb073e6d8a319" providerId="LiveId" clId="{00521DE1-400C-4DFA-B2EA-22EF9A2280FF}" dt="2020-01-10T09:21:14.512" v="8" actId="478"/>
+          <ac:cxnSpMkLst>
+            <pc:docMk/>
+            <pc:sldMk cId="592735644" sldId="256"/>
+            <ac:cxnSpMk id="28" creationId="{7B14EBE0-F2FC-4F47-AA95-70B3912BD85F}"/>
+          </ac:cxnSpMkLst>
+        </pc:cxnChg>
+        <pc:cxnChg chg="mod">
+          <ac:chgData name="Vivian G" userId="217fb073e6d8a319" providerId="LiveId" clId="{00521DE1-400C-4DFA-B2EA-22EF9A2280FF}" dt="2020-01-10T09:42:22.107" v="354" actId="14100"/>
+          <ac:cxnSpMkLst>
+            <pc:docMk/>
+            <pc:sldMk cId="592735644" sldId="256"/>
+            <ac:cxnSpMk id="30" creationId="{A0DA4ECA-02CA-4398-AB33-7CD51F1871BB}"/>
+          </ac:cxnSpMkLst>
+        </pc:cxnChg>
+        <pc:cxnChg chg="mod">
+          <ac:chgData name="Vivian G" userId="217fb073e6d8a319" providerId="LiveId" clId="{00521DE1-400C-4DFA-B2EA-22EF9A2280FF}" dt="2020-01-10T09:42:19.754" v="353" actId="14100"/>
+          <ac:cxnSpMkLst>
+            <pc:docMk/>
+            <pc:sldMk cId="592735644" sldId="256"/>
+            <ac:cxnSpMk id="32" creationId="{9859E110-C259-48A3-B9A2-E0CCFFFE4215}"/>
+          </ac:cxnSpMkLst>
+        </pc:cxnChg>
+        <pc:cxnChg chg="add mod">
+          <ac:chgData name="Vivian G" userId="217fb073e6d8a319" providerId="LiveId" clId="{00521DE1-400C-4DFA-B2EA-22EF9A2280FF}" dt="2020-01-10T09:43:27.667" v="363" actId="1076"/>
+          <ac:cxnSpMkLst>
+            <pc:docMk/>
+            <pc:sldMk cId="592735644" sldId="256"/>
+            <ac:cxnSpMk id="34" creationId="{4D16244C-0B2E-403D-8DDC-CC20B3DF91C5}"/>
+          </ac:cxnSpMkLst>
+        </pc:cxnChg>
+        <pc:cxnChg chg="mod">
+          <ac:chgData name="Vivian G" userId="217fb073e6d8a319" providerId="LiveId" clId="{00521DE1-400C-4DFA-B2EA-22EF9A2280FF}" dt="2020-01-10T09:42:27.476" v="356" actId="14100"/>
+          <ac:cxnSpMkLst>
+            <pc:docMk/>
+            <pc:sldMk cId="592735644" sldId="256"/>
+            <ac:cxnSpMk id="35" creationId="{69C62E22-5761-41C1-B8E1-DC3E5D0532BB}"/>
+          </ac:cxnSpMkLst>
+        </pc:cxnChg>
+        <pc:cxnChg chg="mod">
+          <ac:chgData name="Vivian G" userId="217fb073e6d8a319" providerId="LiveId" clId="{00521DE1-400C-4DFA-B2EA-22EF9A2280FF}" dt="2020-01-10T09:39:35.017" v="174" actId="1035"/>
+          <ac:cxnSpMkLst>
+            <pc:docMk/>
+            <pc:sldMk cId="592735644" sldId="256"/>
+            <ac:cxnSpMk id="38" creationId="{E4DDC066-8ECE-477D-94D2-FC34B21EC2C1}"/>
+          </ac:cxnSpMkLst>
+        </pc:cxnChg>
+        <pc:cxnChg chg="mod">
+          <ac:chgData name="Vivian G" userId="217fb073e6d8a319" providerId="LiveId" clId="{00521DE1-400C-4DFA-B2EA-22EF9A2280FF}" dt="2020-01-10T09:40:17.611" v="203" actId="1076"/>
+          <ac:cxnSpMkLst>
+            <pc:docMk/>
+            <pc:sldMk cId="592735644" sldId="256"/>
+            <ac:cxnSpMk id="39" creationId="{9F41C57E-9025-4754-A594-24117680F845}"/>
+          </ac:cxnSpMkLst>
+        </pc:cxnChg>
+        <pc:cxnChg chg="mod">
+          <ac:chgData name="Vivian G" userId="217fb073e6d8a319" providerId="LiveId" clId="{00521DE1-400C-4DFA-B2EA-22EF9A2280FF}" dt="2020-01-10T09:41:05.115" v="296" actId="1036"/>
+          <ac:cxnSpMkLst>
+            <pc:docMk/>
+            <pc:sldMk cId="592735644" sldId="256"/>
+            <ac:cxnSpMk id="40" creationId="{84C1FE27-4209-44D1-9460-9210E7B73371}"/>
+          </ac:cxnSpMkLst>
+        </pc:cxnChg>
+        <pc:cxnChg chg="mod">
+          <ac:chgData name="Vivian G" userId="217fb073e6d8a319" providerId="LiveId" clId="{00521DE1-400C-4DFA-B2EA-22EF9A2280FF}" dt="2020-01-10T09:42:29.980" v="357" actId="14100"/>
+          <ac:cxnSpMkLst>
+            <pc:docMk/>
+            <pc:sldMk cId="592735644" sldId="256"/>
+            <ac:cxnSpMk id="42" creationId="{1CBDFC55-0794-48E5-9B54-0B4FD6E3D199}"/>
+          </ac:cxnSpMkLst>
+        </pc:cxnChg>
+        <pc:cxnChg chg="del mod">
+          <ac:chgData name="Vivian G" userId="217fb073e6d8a319" providerId="LiveId" clId="{00521DE1-400C-4DFA-B2EA-22EF9A2280FF}" dt="2020-01-10T09:42:43.987" v="360" actId="478"/>
+          <ac:cxnSpMkLst>
+            <pc:docMk/>
+            <pc:sldMk cId="592735644" sldId="256"/>
+            <ac:cxnSpMk id="44" creationId="{46F102DC-5C2F-4AB7-BCD5-BB16D6725DB9}"/>
+          </ac:cxnSpMkLst>
+        </pc:cxnChg>
+        <pc:cxnChg chg="add mod">
+          <ac:chgData name="Vivian G" userId="217fb073e6d8a319" providerId="LiveId" clId="{00521DE1-400C-4DFA-B2EA-22EF9A2280FF}" dt="2020-01-10T09:41:17.599" v="306" actId="1076"/>
+          <ac:cxnSpMkLst>
+            <pc:docMk/>
+            <pc:sldMk cId="592735644" sldId="256"/>
+            <ac:cxnSpMk id="45" creationId="{9B518ACD-BFE8-4E52-ABB4-0E9C318B8650}"/>
+          </ac:cxnSpMkLst>
+        </pc:cxnChg>
+        <pc:cxnChg chg="add del">
+          <ac:chgData name="Vivian G" userId="217fb073e6d8a319" providerId="LiveId" clId="{00521DE1-400C-4DFA-B2EA-22EF9A2280FF}" dt="2020-01-10T09:41:31.082" v="311"/>
+          <ac:cxnSpMkLst>
+            <pc:docMk/>
+            <pc:sldMk cId="592735644" sldId="256"/>
+            <ac:cxnSpMk id="47" creationId="{35C39CA1-123C-432C-AA19-63A6DB3FF357}"/>
+          </ac:cxnSpMkLst>
+        </pc:cxnChg>
+        <pc:cxnChg chg="mod">
+          <ac:chgData name="Vivian G" userId="217fb073e6d8a319" providerId="LiveId" clId="{00521DE1-400C-4DFA-B2EA-22EF9A2280FF}" dt="2020-01-10T11:04:08.224" v="366" actId="14100"/>
+          <ac:cxnSpMkLst>
+            <pc:docMk/>
+            <pc:sldMk cId="592735644" sldId="256"/>
+            <ac:cxnSpMk id="50" creationId="{99AA1EBE-8791-4424-A504-38E02A162041}"/>
+          </ac:cxnSpMkLst>
+        </pc:cxnChg>
+        <pc:cxnChg chg="mod">
+          <ac:chgData name="Vivian G" userId="217fb073e6d8a319" providerId="LiveId" clId="{00521DE1-400C-4DFA-B2EA-22EF9A2280FF}" dt="2020-01-10T09:40:22.542" v="217" actId="1035"/>
+          <ac:cxnSpMkLst>
+            <pc:docMk/>
+            <pc:sldMk cId="592735644" sldId="256"/>
+            <ac:cxnSpMk id="56" creationId="{CEB6944E-8164-49DC-9C61-C0EDCF442ED0}"/>
+          </ac:cxnSpMkLst>
+        </pc:cxnChg>
+        <pc:cxnChg chg="add mod">
+          <ac:chgData name="Vivian G" userId="217fb073e6d8a319" providerId="LiveId" clId="{00521DE1-400C-4DFA-B2EA-22EF9A2280FF}" dt="2020-01-10T09:42:57.389" v="362" actId="13822"/>
+          <ac:cxnSpMkLst>
+            <pc:docMk/>
+            <pc:sldMk cId="592735644" sldId="256"/>
+            <ac:cxnSpMk id="57" creationId="{97117D4D-1D5B-44EB-905B-1A7BD426B16A}"/>
+          </ac:cxnSpMkLst>
+        </pc:cxnChg>
+        <pc:cxnChg chg="mod">
+          <ac:chgData name="Vivian G" userId="217fb073e6d8a319" providerId="LiveId" clId="{00521DE1-400C-4DFA-B2EA-22EF9A2280FF}" dt="2020-01-10T11:03:53.107" v="365" actId="14100"/>
+          <ac:cxnSpMkLst>
+            <pc:docMk/>
+            <pc:sldMk cId="592735644" sldId="256"/>
+            <ac:cxnSpMk id="58" creationId="{B987C74E-32AE-4807-A479-780B0A7353A0}"/>
           </ac:cxnSpMkLst>
         </pc:cxnChg>
       </pc:sldChg>
@@ -840,7 +1128,7 @@
           <a:p>
             <a:fld id="{03D0E808-2280-47D8-B66B-238F58F10961}" type="datetimeFigureOut">
               <a:rPr lang="fr-FR" smtClean="0"/>
-              <a:t>06/01/2020</a:t>
+              <a:t>10/01/2020</a:t>
             </a:fld>
             <a:endParaRPr lang="fr-FR"/>
           </a:p>
@@ -1038,7 +1326,7 @@
           <a:p>
             <a:fld id="{03D0E808-2280-47D8-B66B-238F58F10961}" type="datetimeFigureOut">
               <a:rPr lang="fr-FR" smtClean="0"/>
-              <a:t>06/01/2020</a:t>
+              <a:t>10/01/2020</a:t>
             </a:fld>
             <a:endParaRPr lang="fr-FR"/>
           </a:p>
@@ -1246,7 +1534,7 @@
           <a:p>
             <a:fld id="{03D0E808-2280-47D8-B66B-238F58F10961}" type="datetimeFigureOut">
               <a:rPr lang="fr-FR" smtClean="0"/>
-              <a:t>06/01/2020</a:t>
+              <a:t>10/01/2020</a:t>
             </a:fld>
             <a:endParaRPr lang="fr-FR"/>
           </a:p>
@@ -1444,7 +1732,7 @@
           <a:p>
             <a:fld id="{03D0E808-2280-47D8-B66B-238F58F10961}" type="datetimeFigureOut">
               <a:rPr lang="fr-FR" smtClean="0"/>
-              <a:t>06/01/2020</a:t>
+              <a:t>10/01/2020</a:t>
             </a:fld>
             <a:endParaRPr lang="fr-FR"/>
           </a:p>
@@ -1719,7 +2007,7 @@
           <a:p>
             <a:fld id="{03D0E808-2280-47D8-B66B-238F58F10961}" type="datetimeFigureOut">
               <a:rPr lang="fr-FR" smtClean="0"/>
-              <a:t>06/01/2020</a:t>
+              <a:t>10/01/2020</a:t>
             </a:fld>
             <a:endParaRPr lang="fr-FR"/>
           </a:p>
@@ -1984,7 +2272,7 @@
           <a:p>
             <a:fld id="{03D0E808-2280-47D8-B66B-238F58F10961}" type="datetimeFigureOut">
               <a:rPr lang="fr-FR" smtClean="0"/>
-              <a:t>06/01/2020</a:t>
+              <a:t>10/01/2020</a:t>
             </a:fld>
             <a:endParaRPr lang="fr-FR"/>
           </a:p>
@@ -2396,7 +2684,7 @@
           <a:p>
             <a:fld id="{03D0E808-2280-47D8-B66B-238F58F10961}" type="datetimeFigureOut">
               <a:rPr lang="fr-FR" smtClean="0"/>
-              <a:t>06/01/2020</a:t>
+              <a:t>10/01/2020</a:t>
             </a:fld>
             <a:endParaRPr lang="fr-FR"/>
           </a:p>
@@ -2537,7 +2825,7 @@
           <a:p>
             <a:fld id="{03D0E808-2280-47D8-B66B-238F58F10961}" type="datetimeFigureOut">
               <a:rPr lang="fr-FR" smtClean="0"/>
-              <a:t>06/01/2020</a:t>
+              <a:t>10/01/2020</a:t>
             </a:fld>
             <a:endParaRPr lang="fr-FR"/>
           </a:p>
@@ -2650,7 +2938,7 @@
           <a:p>
             <a:fld id="{03D0E808-2280-47D8-B66B-238F58F10961}" type="datetimeFigureOut">
               <a:rPr lang="fr-FR" smtClean="0"/>
-              <a:t>06/01/2020</a:t>
+              <a:t>10/01/2020</a:t>
             </a:fld>
             <a:endParaRPr lang="fr-FR"/>
           </a:p>
@@ -2961,7 +3249,7 @@
           <a:p>
             <a:fld id="{03D0E808-2280-47D8-B66B-238F58F10961}" type="datetimeFigureOut">
               <a:rPr lang="fr-FR" smtClean="0"/>
-              <a:t>06/01/2020</a:t>
+              <a:t>10/01/2020</a:t>
             </a:fld>
             <a:endParaRPr lang="fr-FR"/>
           </a:p>
@@ -3249,7 +3537,7 @@
           <a:p>
             <a:fld id="{03D0E808-2280-47D8-B66B-238F58F10961}" type="datetimeFigureOut">
               <a:rPr lang="fr-FR" smtClean="0"/>
-              <a:t>06/01/2020</a:t>
+              <a:t>10/01/2020</a:t>
             </a:fld>
             <a:endParaRPr lang="fr-FR"/>
           </a:p>
@@ -3490,7 +3778,7 @@
           <a:p>
             <a:fld id="{03D0E808-2280-47D8-B66B-238F58F10961}" type="datetimeFigureOut">
               <a:rPr lang="fr-FR" smtClean="0"/>
-              <a:t>06/01/2020</a:t>
+              <a:t>10/01/2020</a:t>
             </a:fld>
             <a:endParaRPr lang="fr-FR"/>
           </a:p>
@@ -3921,7 +4209,7 @@
         </p:nvCxnSpPr>
         <p:spPr>
           <a:xfrm>
-            <a:off x="443158" y="2946890"/>
+            <a:off x="443158" y="2742698"/>
             <a:ext cx="11547835" cy="0"/>
           </a:xfrm>
           <a:prstGeom prst="line">
@@ -3966,7 +4254,7 @@
         </p:nvCxnSpPr>
         <p:spPr>
           <a:xfrm>
-            <a:off x="443158" y="4328015"/>
+            <a:off x="385854" y="3845910"/>
             <a:ext cx="11547835" cy="0"/>
           </a:xfrm>
           <a:prstGeom prst="line">
@@ -4011,7 +4299,7 @@
         </p:nvSpPr>
         <p:spPr>
           <a:xfrm>
-            <a:off x="4513868" y="2073912"/>
+            <a:off x="4513868" y="2002888"/>
             <a:ext cx="3932549" cy="340519"/>
           </a:xfrm>
           <a:prstGeom prst="roundRect">
@@ -4052,7 +4340,7 @@
         </p:nvSpPr>
         <p:spPr>
           <a:xfrm>
-            <a:off x="311085" y="2073912"/>
+            <a:off x="311085" y="2002888"/>
             <a:ext cx="1630837" cy="307777"/>
           </a:xfrm>
           <a:prstGeom prst="rect">
@@ -4087,7 +4375,7 @@
         </p:nvSpPr>
         <p:spPr>
           <a:xfrm>
-            <a:off x="311084" y="3517784"/>
+            <a:off x="311084" y="3198187"/>
             <a:ext cx="1979630" cy="276999"/>
           </a:xfrm>
           <a:prstGeom prst="rect">
@@ -4122,7 +4410,7 @@
         </p:nvSpPr>
         <p:spPr>
           <a:xfrm>
-            <a:off x="311084" y="4942803"/>
+            <a:off x="311084" y="4401263"/>
             <a:ext cx="1630837" cy="307777"/>
           </a:xfrm>
           <a:prstGeom prst="rect">
@@ -4157,7 +4445,7 @@
         </p:nvSpPr>
         <p:spPr>
           <a:xfrm>
-            <a:off x="1911505" y="3498489"/>
+            <a:off x="1911505" y="3178892"/>
             <a:ext cx="1979630" cy="340519"/>
           </a:xfrm>
           <a:prstGeom prst="roundRect">
@@ -4198,7 +4486,7 @@
         </p:nvSpPr>
         <p:spPr>
           <a:xfrm>
-            <a:off x="5198883" y="3505392"/>
+            <a:off x="5198883" y="3185795"/>
             <a:ext cx="2562518" cy="340519"/>
           </a:xfrm>
           <a:prstGeom prst="roundRect">
@@ -4239,7 +4527,7 @@
         </p:nvSpPr>
         <p:spPr>
           <a:xfrm>
-            <a:off x="9069151" y="3499732"/>
+            <a:off x="9069151" y="3180135"/>
             <a:ext cx="2033047" cy="340519"/>
           </a:xfrm>
           <a:prstGeom prst="roundRect">
@@ -4280,7 +4568,7 @@
         </p:nvSpPr>
         <p:spPr>
           <a:xfrm>
-            <a:off x="1306396" y="4958679"/>
+            <a:off x="3161832" y="4417139"/>
             <a:ext cx="1437588" cy="340519"/>
           </a:xfrm>
           <a:prstGeom prst="roundRect">
@@ -4321,7 +4609,7 @@
         </p:nvSpPr>
         <p:spPr>
           <a:xfrm>
-            <a:off x="3173971" y="4825384"/>
+            <a:off x="1407312" y="4283844"/>
             <a:ext cx="1437588" cy="578882"/>
           </a:xfrm>
           <a:prstGeom prst="roundRect">
@@ -4362,7 +4650,7 @@
         </p:nvSpPr>
         <p:spPr>
           <a:xfrm>
-            <a:off x="6982009" y="4824601"/>
+            <a:off x="6982009" y="4283061"/>
             <a:ext cx="1585275" cy="578882"/>
           </a:xfrm>
           <a:prstGeom prst="roundRect">
@@ -4383,12 +4671,8 @@
           <a:p>
             <a:pPr algn="ctr"/>
             <a:r>
-              <a:rPr lang="fr-FR" sz="1400"/>
-              <a:t>Validation </a:t>
-            </a:r>
-            <a:r>
               <a:rPr lang="fr-FR" sz="1400" dirty="0"/>
-              <a:t>des notes de frais</a:t>
+              <a:t>Validation des notes de frais</a:t>
             </a:r>
           </a:p>
         </p:txBody>
@@ -4407,7 +4691,7 @@
         </p:nvSpPr>
         <p:spPr>
           <a:xfrm>
-            <a:off x="4963494" y="4825021"/>
+            <a:off x="4963494" y="4283481"/>
             <a:ext cx="1751814" cy="578882"/>
           </a:xfrm>
           <a:prstGeom prst="roundRect">
@@ -4448,8 +4732,8 @@
         </p:nvSpPr>
         <p:spPr>
           <a:xfrm>
-            <a:off x="9069150" y="4839497"/>
-            <a:ext cx="2045614" cy="578882"/>
+            <a:off x="9069150" y="4297957"/>
+            <a:ext cx="2033048" cy="578882"/>
           </a:xfrm>
           <a:prstGeom prst="roundRect">
             <a:avLst/>
@@ -4525,7 +4809,7 @@
         </p:nvCxnSpPr>
         <p:spPr>
           <a:xfrm>
-            <a:off x="443158" y="5897735"/>
+            <a:off x="443157" y="5201339"/>
             <a:ext cx="11547835" cy="0"/>
           </a:xfrm>
           <a:prstGeom prst="line">
@@ -4617,13 +4901,13 @@
           <p:nvPr/>
         </p:nvCxnSpPr>
         <p:spPr>
-          <a:xfrm rot="5400000">
-            <a:off x="1903420" y="3960778"/>
-            <a:ext cx="1119671" cy="876130"/>
+          <a:xfrm rot="16200000" flipH="1">
+            <a:off x="2942109" y="3478622"/>
+            <a:ext cx="897728" cy="979306"/>
           </a:xfrm>
           <a:prstGeom prst="bentConnector3">
             <a:avLst>
-              <a:gd name="adj1" fmla="val 44450"/>
+              <a:gd name="adj1" fmla="val 36155"/>
             </a:avLst>
           </a:prstGeom>
         </p:spPr>
@@ -4652,18 +4936,21 @@
             </a:extLst>
           </p:cNvPr>
           <p:cNvCxnSpPr>
+            <a:cxnSpLocks/>
             <a:stCxn id="9" idx="2"/>
             <a:endCxn id="13" idx="0"/>
           </p:cNvCxnSpPr>
           <p:nvPr/>
         </p:nvCxnSpPr>
         <p:spPr>
-          <a:xfrm rot="16200000" flipH="1">
-            <a:off x="2903854" y="3836473"/>
-            <a:ext cx="986376" cy="991445"/>
+          <a:xfrm rot="5400000">
+            <a:off x="2131497" y="3514020"/>
+            <a:ext cx="764433" cy="775214"/>
           </a:xfrm>
           <a:prstGeom prst="bentConnector3">
-            <a:avLst/>
+            <a:avLst>
+              <a:gd name="adj1" fmla="val 43032"/>
+            </a:avLst>
           </a:prstGeom>
         </p:spPr>
         <p:style>
@@ -4691,6 +4978,7 @@
             </a:extLst>
           </p:cNvPr>
           <p:cNvCxnSpPr>
+            <a:cxnSpLocks/>
             <a:stCxn id="10" idx="2"/>
             <a:endCxn id="15" idx="0"/>
           </p:cNvCxnSpPr>
@@ -4698,12 +4986,19 @@
         </p:nvCxnSpPr>
         <p:spPr>
           <a:xfrm rot="5400000">
-            <a:off x="5670217" y="4015096"/>
-            <a:ext cx="979110" cy="640741"/>
+            <a:off x="5781189" y="3584527"/>
+            <a:ext cx="757167" cy="640741"/>
           </a:xfrm>
           <a:prstGeom prst="bentConnector3">
-            <a:avLst/>
+            <a:avLst>
+              <a:gd name="adj1" fmla="val 42965"/>
+            </a:avLst>
           </a:prstGeom>
+          <a:ln>
+            <a:solidFill>
+              <a:srgbClr val="FF0000"/>
+            </a:solidFill>
+          </a:ln>
         </p:spPr>
         <p:style>
           <a:lnRef idx="1">
@@ -4737,53 +5032,19 @@
         </p:nvCxnSpPr>
         <p:spPr>
           <a:xfrm rot="16200000" flipH="1">
-            <a:off x="6638049" y="3688003"/>
-            <a:ext cx="978690" cy="1294505"/>
-          </a:xfrm>
-          <a:prstGeom prst="bentConnector3">
-            <a:avLst/>
-          </a:prstGeom>
-        </p:spPr>
-        <p:style>
-          <a:lnRef idx="1">
-            <a:schemeClr val="accent1"/>
-          </a:lnRef>
-          <a:fillRef idx="0">
-            <a:schemeClr val="accent1"/>
-          </a:fillRef>
-          <a:effectRef idx="0">
-            <a:schemeClr val="accent1"/>
-          </a:effectRef>
-          <a:fontRef idx="minor">
-            <a:schemeClr val="tx1"/>
-          </a:fontRef>
-        </p:style>
-      </p:cxnSp>
-      <p:cxnSp>
-        <p:nvCxnSpPr>
-          <p:cNvPr id="44" name="Connecteur : en angle 43">
-            <a:extLst>
-              <a:ext uri="{FF2B5EF4-FFF2-40B4-BE49-F238E27FC236}">
-                <a16:creationId xmlns:a16="http://schemas.microsoft.com/office/drawing/2014/main" id="{46F102DC-5C2F-4AB7-BCD5-BB16D6725DB9}"/>
-              </a:ext>
-            </a:extLst>
-          </p:cNvPr>
-          <p:cNvCxnSpPr>
-            <a:stCxn id="11" idx="2"/>
-            <a:endCxn id="16" idx="0"/>
-          </p:cNvCxnSpPr>
-          <p:nvPr/>
-        </p:nvCxnSpPr>
-        <p:spPr>
-          <a:xfrm rot="16200000" flipH="1">
-            <a:off x="9589193" y="4336733"/>
-            <a:ext cx="999246" cy="6282"/>
+            <a:off x="6749021" y="3257434"/>
+            <a:ext cx="756747" cy="1294505"/>
           </a:xfrm>
           <a:prstGeom prst="bentConnector3">
             <a:avLst>
-              <a:gd name="adj1" fmla="val 50000"/>
+              <a:gd name="adj1" fmla="val 42961"/>
             </a:avLst>
           </a:prstGeom>
+          <a:ln>
+            <a:solidFill>
+              <a:srgbClr val="FF0000"/>
+            </a:solidFill>
+          </a:ln>
         </p:spPr>
         <p:style>
           <a:lnRef idx="1">
@@ -4817,12 +5078,19 @@
         </p:nvCxnSpPr>
         <p:spPr>
           <a:xfrm rot="5400000">
-            <a:off x="4148703" y="1167049"/>
-            <a:ext cx="1084058" cy="3578823"/>
+            <a:off x="4272990" y="971738"/>
+            <a:ext cx="835485" cy="3578823"/>
           </a:xfrm>
           <a:prstGeom prst="bentConnector3">
-            <a:avLst/>
+            <a:avLst>
+              <a:gd name="adj1" fmla="val 47875"/>
+            </a:avLst>
           </a:prstGeom>
+          <a:ln>
+            <a:solidFill>
+              <a:schemeClr val="tx1"/>
+            </a:solidFill>
+          </a:ln>
         </p:spPr>
         <p:style>
           <a:lnRef idx="1">
@@ -4856,12 +5124,17 @@
         </p:nvCxnSpPr>
         <p:spPr>
           <a:xfrm rot="5400000">
-            <a:off x="5934663" y="2959911"/>
-            <a:ext cx="1090961" cy="1"/>
+            <a:off x="6058949" y="2764601"/>
+            <a:ext cx="842388" cy="1"/>
           </a:xfrm>
           <a:prstGeom prst="bentConnector3">
             <a:avLst/>
           </a:prstGeom>
+          <a:ln>
+            <a:solidFill>
+              <a:schemeClr val="tx1"/>
+            </a:solidFill>
+          </a:ln>
         </p:spPr>
         <p:style>
           <a:lnRef idx="1">
@@ -4895,12 +5168,19 @@
         </p:nvCxnSpPr>
         <p:spPr>
           <a:xfrm rot="16200000" flipH="1">
-            <a:off x="7740259" y="1154315"/>
-            <a:ext cx="1085301" cy="3605532"/>
+            <a:off x="7864545" y="959005"/>
+            <a:ext cx="836728" cy="3605532"/>
           </a:xfrm>
           <a:prstGeom prst="bentConnector3">
-            <a:avLst/>
+            <a:avLst>
+              <a:gd name="adj1" fmla="val 47878"/>
+            </a:avLst>
           </a:prstGeom>
+          <a:ln>
+            <a:solidFill>
+              <a:schemeClr val="tx1"/>
+            </a:solidFill>
+          </a:ln>
         </p:spPr>
         <p:style>
           <a:lnRef idx="1">
@@ -4911,6 +5191,254 @@
           </a:fillRef>
           <a:effectRef idx="0">
             <a:schemeClr val="accent1"/>
+          </a:effectRef>
+          <a:fontRef idx="minor">
+            <a:schemeClr val="tx1"/>
+          </a:fontRef>
+        </p:style>
+      </p:cxnSp>
+      <p:cxnSp>
+        <p:nvCxnSpPr>
+          <p:cNvPr id="21" name="Connecteur : en angle 20">
+            <a:extLst>
+              <a:ext uri="{FF2B5EF4-FFF2-40B4-BE49-F238E27FC236}">
+                <a16:creationId xmlns:a16="http://schemas.microsoft.com/office/drawing/2014/main" id="{D863ACD5-98FF-4C8E-93C9-ED08269FE3BF}"/>
+              </a:ext>
+            </a:extLst>
+          </p:cNvPr>
+          <p:cNvCxnSpPr>
+            <a:cxnSpLocks/>
+            <a:stCxn id="10" idx="2"/>
+            <a:endCxn id="12" idx="0"/>
+          </p:cNvCxnSpPr>
+          <p:nvPr/>
+        </p:nvCxnSpPr>
+        <p:spPr>
+          <a:xfrm rot="5400000">
+            <a:off x="4734972" y="2671968"/>
+            <a:ext cx="890825" cy="2599516"/>
+          </a:xfrm>
+          <a:prstGeom prst="bentConnector3">
+            <a:avLst>
+              <a:gd name="adj1" fmla="val 16117"/>
+            </a:avLst>
+          </a:prstGeom>
+          <a:ln>
+            <a:solidFill>
+              <a:srgbClr val="FF0000"/>
+            </a:solidFill>
+          </a:ln>
+        </p:spPr>
+        <p:style>
+          <a:lnRef idx="1">
+            <a:schemeClr val="accent1"/>
+          </a:lnRef>
+          <a:fillRef idx="0">
+            <a:schemeClr val="accent1"/>
+          </a:fillRef>
+          <a:effectRef idx="0">
+            <a:schemeClr val="accent1"/>
+          </a:effectRef>
+          <a:fontRef idx="minor">
+            <a:schemeClr val="tx1"/>
+          </a:fontRef>
+        </p:style>
+      </p:cxnSp>
+      <p:sp>
+        <p:nvSpPr>
+          <p:cNvPr id="43" name="ZoneTexte 42">
+            <a:extLst>
+              <a:ext uri="{FF2B5EF4-FFF2-40B4-BE49-F238E27FC236}">
+                <a16:creationId xmlns:a16="http://schemas.microsoft.com/office/drawing/2014/main" id="{74C49387-C25C-45C2-A515-24B7FC6723AF}"/>
+              </a:ext>
+            </a:extLst>
+          </p:cNvPr>
+          <p:cNvSpPr txBox="1"/>
+          <p:nvPr/>
+        </p:nvSpPr>
+        <p:spPr>
+          <a:xfrm>
+            <a:off x="280668" y="5629978"/>
+            <a:ext cx="1630837" cy="307777"/>
+          </a:xfrm>
+          <a:prstGeom prst="rect">
+            <a:avLst/>
+          </a:prstGeom>
+          <a:noFill/>
+        </p:spPr>
+        <p:txBody>
+          <a:bodyPr wrap="square" rtlCol="0">
+            <a:spAutoFit/>
+          </a:bodyPr>
+          <a:lstStyle/>
+          <a:p>
+            <a:r>
+              <a:rPr lang="fr-FR" sz="1400" dirty="0"/>
+              <a:t>Niveau 2</a:t>
+            </a:r>
+          </a:p>
+        </p:txBody>
+      </p:sp>
+      <p:cxnSp>
+        <p:nvCxnSpPr>
+          <p:cNvPr id="45" name="Connecteur droit 44">
+            <a:extLst>
+              <a:ext uri="{FF2B5EF4-FFF2-40B4-BE49-F238E27FC236}">
+                <a16:creationId xmlns:a16="http://schemas.microsoft.com/office/drawing/2014/main" id="{9B518ACD-BFE8-4E52-ABB4-0E9C318B8650}"/>
+              </a:ext>
+            </a:extLst>
+          </p:cNvPr>
+          <p:cNvCxnSpPr/>
+          <p:nvPr/>
+        </p:nvCxnSpPr>
+        <p:spPr>
+          <a:xfrm>
+            <a:off x="385854" y="6296015"/>
+            <a:ext cx="11547835" cy="0"/>
+          </a:xfrm>
+          <a:prstGeom prst="line">
+            <a:avLst/>
+          </a:prstGeom>
+          <a:ln w="9525" cap="flat" cmpd="sng" algn="ctr">
+            <a:solidFill>
+              <a:schemeClr val="accent3"/>
+            </a:solidFill>
+            <a:prstDash val="dash"/>
+            <a:round/>
+            <a:headEnd type="none" w="med" len="med"/>
+            <a:tailEnd type="none" w="med" len="med"/>
+          </a:ln>
+        </p:spPr>
+        <p:style>
+          <a:lnRef idx="0">
+            <a:scrgbClr r="0" g="0" b="0"/>
+          </a:lnRef>
+          <a:fillRef idx="0">
+            <a:scrgbClr r="0" g="0" b="0"/>
+          </a:fillRef>
+          <a:effectRef idx="0">
+            <a:scrgbClr r="0" g="0" b="0"/>
+          </a:effectRef>
+          <a:fontRef idx="minor">
+            <a:schemeClr val="tx1"/>
+          </a:fontRef>
+        </p:style>
+      </p:cxnSp>
+      <p:sp>
+        <p:nvSpPr>
+          <p:cNvPr id="48" name="ZoneTexte 47">
+            <a:extLst>
+              <a:ext uri="{FF2B5EF4-FFF2-40B4-BE49-F238E27FC236}">
+                <a16:creationId xmlns:a16="http://schemas.microsoft.com/office/drawing/2014/main" id="{63FCBDCE-0399-46AA-85D9-72870B078A6D}"/>
+              </a:ext>
+            </a:extLst>
+          </p:cNvPr>
+          <p:cNvSpPr txBox="1"/>
+          <p:nvPr/>
+        </p:nvSpPr>
+        <p:spPr>
+          <a:xfrm>
+            <a:off x="6982009" y="5489997"/>
+            <a:ext cx="1585275" cy="578882"/>
+          </a:xfrm>
+          <a:prstGeom prst="roundRect">
+            <a:avLst/>
+          </a:prstGeom>
+          <a:solidFill>
+            <a:srgbClr val="F78F81"/>
+          </a:solidFill>
+        </p:spPr>
+        <p:txBody>
+          <a:bodyPr wrap="square" rtlCol="0">
+            <a:spAutoFit/>
+          </a:bodyPr>
+          <a:lstStyle/>
+          <a:p>
+            <a:pPr algn="ctr"/>
+            <a:r>
+              <a:rPr lang="fr-FR" sz="1400" dirty="0"/>
+              <a:t>Descriptif détaillé demande</a:t>
+            </a:r>
+          </a:p>
+        </p:txBody>
+      </p:sp>
+      <p:cxnSp>
+        <p:nvCxnSpPr>
+          <p:cNvPr id="34" name="Connecteur droit 33">
+            <a:extLst>
+              <a:ext uri="{FF2B5EF4-FFF2-40B4-BE49-F238E27FC236}">
+                <a16:creationId xmlns:a16="http://schemas.microsoft.com/office/drawing/2014/main" id="{4D16244C-0B2E-403D-8DDC-CC20B3DF91C5}"/>
+              </a:ext>
+            </a:extLst>
+          </p:cNvPr>
+          <p:cNvCxnSpPr>
+            <a:stCxn id="14" idx="2"/>
+            <a:endCxn id="48" idx="0"/>
+          </p:cNvCxnSpPr>
+          <p:nvPr/>
+        </p:nvCxnSpPr>
+        <p:spPr>
+          <a:xfrm>
+            <a:off x="7774647" y="4861943"/>
+            <a:ext cx="0" cy="628054"/>
+          </a:xfrm>
+          <a:prstGeom prst="line">
+            <a:avLst/>
+          </a:prstGeom>
+          <a:ln>
+            <a:solidFill>
+              <a:srgbClr val="FF0000"/>
+            </a:solidFill>
+          </a:ln>
+        </p:spPr>
+        <p:style>
+          <a:lnRef idx="1">
+            <a:schemeClr val="accent1"/>
+          </a:lnRef>
+          <a:fillRef idx="0">
+            <a:schemeClr val="accent1"/>
+          </a:fillRef>
+          <a:effectRef idx="0">
+            <a:schemeClr val="accent1"/>
+          </a:effectRef>
+          <a:fontRef idx="minor">
+            <a:schemeClr val="tx1"/>
+          </a:fontRef>
+        </p:style>
+      </p:cxnSp>
+      <p:cxnSp>
+        <p:nvCxnSpPr>
+          <p:cNvPr id="57" name="Connecteur droit 56">
+            <a:extLst>
+              <a:ext uri="{FF2B5EF4-FFF2-40B4-BE49-F238E27FC236}">
+                <a16:creationId xmlns:a16="http://schemas.microsoft.com/office/drawing/2014/main" id="{97117D4D-1D5B-44EB-905B-1A7BD426B16A}"/>
+              </a:ext>
+            </a:extLst>
+          </p:cNvPr>
+          <p:cNvCxnSpPr>
+            <a:stCxn id="11" idx="2"/>
+            <a:endCxn id="16" idx="0"/>
+          </p:cNvCxnSpPr>
+          <p:nvPr/>
+        </p:nvCxnSpPr>
+        <p:spPr>
+          <a:xfrm flipH="1">
+            <a:off x="10085674" y="3520654"/>
+            <a:ext cx="1" cy="777303"/>
+          </a:xfrm>
+          <a:prstGeom prst="line">
+            <a:avLst/>
+          </a:prstGeom>
+        </p:spPr>
+        <p:style>
+          <a:lnRef idx="1">
+            <a:schemeClr val="accent6"/>
+          </a:lnRef>
+          <a:fillRef idx="0">
+            <a:schemeClr val="accent6"/>
+          </a:fillRef>
+          <a:effectRef idx="0">
+            <a:schemeClr val="accent6"/>
           </a:effectRef>
           <a:fontRef idx="minor">
             <a:schemeClr val="tx1"/>

</xml_diff>